<commit_message>
UPDATE gui part implementation
ADD new pictures
</commit_message>
<xml_diff>
--- a/doc/gui/Bilder/Präsentation1.pptx
+++ b/doc/gui/Bilder/Präsentation1.pptx
@@ -7,6 +7,7 @@
   <p:sldIdLst>
     <p:sldId id="256" r:id="rId2"/>
     <p:sldId id="257" r:id="rId3"/>
+    <p:sldId id="258" r:id="rId4"/>
   </p:sldIdLst>
   <p:sldSz cx="12192000" cy="6858000"/>
   <p:notesSz cx="6858000" cy="9144000"/>
@@ -3251,6 +3252,74 @@
           <a:prstGeom prst="rect">
             <a:avLst/>
           </a:prstGeom>
+          <a:gradFill>
+            <a:gsLst>
+              <a:gs pos="0">
+                <a:schemeClr val="accent5">
+                  <a:lumMod val="20000"/>
+                  <a:lumOff val="80000"/>
+                </a:schemeClr>
+              </a:gs>
+              <a:gs pos="50000">
+                <a:schemeClr val="accent5">
+                  <a:lumMod val="60000"/>
+                  <a:lumOff val="40000"/>
+                </a:schemeClr>
+              </a:gs>
+              <a:gs pos="100000">
+                <a:schemeClr val="accent5">
+                  <a:lumMod val="60000"/>
+                  <a:lumOff val="40000"/>
+                </a:schemeClr>
+              </a:gs>
+            </a:gsLst>
+          </a:gradFill>
+        </p:spPr>
+        <p:style>
+          <a:lnRef idx="0">
+            <a:schemeClr val="accent5"/>
+          </a:lnRef>
+          <a:fillRef idx="3">
+            <a:schemeClr val="accent5"/>
+          </a:fillRef>
+          <a:effectRef idx="3">
+            <a:schemeClr val="accent5"/>
+          </a:effectRef>
+          <a:fontRef idx="minor">
+            <a:schemeClr val="lt1"/>
+          </a:fontRef>
+        </p:style>
+        <p:txBody>
+          <a:bodyPr rtlCol="0" anchor="ctr"/>
+          <a:lstStyle/>
+          <a:p>
+            <a:pPr algn="ctr"/>
+            <a:r>
+              <a:rPr lang="de-DE" dirty="0" err="1">
+                <a:latin typeface="Arial Rounded MT Bold" panose="020F0704030504030204" pitchFamily="34" charset="0"/>
+              </a:rPr>
+              <a:t>ViewModel</a:t>
+            </a:r>
+            <a:endParaRPr lang="de-DE" dirty="0">
+              <a:latin typeface="Arial Rounded MT Bold" panose="020F0704030504030204" pitchFamily="34" charset="0"/>
+            </a:endParaRPr>
+          </a:p>
+        </p:txBody>
+      </p:sp>
+      <p:sp>
+        <p:nvSpPr>
+          <p:cNvPr id="6" name="Rechteck 5"/>
+          <p:cNvSpPr/>
+          <p:nvPr/>
+        </p:nvSpPr>
+        <p:spPr>
+          <a:xfrm>
+            <a:off x="4137834" y="4152347"/>
+            <a:ext cx="1842052" cy="1020418"/>
+          </a:xfrm>
+          <a:prstGeom prst="rect">
+            <a:avLst/>
+          </a:prstGeom>
         </p:spPr>
         <p:style>
           <a:lnRef idx="0">
@@ -3272,52 +3341,6 @@
           <a:p>
             <a:pPr algn="ctr"/>
             <a:r>
-              <a:rPr lang="de-DE" dirty="0" err="1">
-                <a:latin typeface="Arial Rounded MT Bold" panose="020F0704030504030204" pitchFamily="34" charset="0"/>
-              </a:rPr>
-              <a:t>ViewModel</a:t>
-            </a:r>
-            <a:endParaRPr lang="de-DE" dirty="0">
-              <a:latin typeface="Arial Rounded MT Bold" panose="020F0704030504030204" pitchFamily="34" charset="0"/>
-            </a:endParaRPr>
-          </a:p>
-        </p:txBody>
-      </p:sp>
-      <p:sp>
-        <p:nvSpPr>
-          <p:cNvPr id="6" name="Rechteck 5"/>
-          <p:cNvSpPr/>
-          <p:nvPr/>
-        </p:nvSpPr>
-        <p:spPr>
-          <a:xfrm>
-            <a:off x="4137834" y="4152347"/>
-            <a:ext cx="1842052" cy="1020418"/>
-          </a:xfrm>
-          <a:prstGeom prst="rect">
-            <a:avLst/>
-          </a:prstGeom>
-        </p:spPr>
-        <p:style>
-          <a:lnRef idx="0">
-            <a:schemeClr val="accent2"/>
-          </a:lnRef>
-          <a:fillRef idx="3">
-            <a:schemeClr val="accent2"/>
-          </a:fillRef>
-          <a:effectRef idx="3">
-            <a:schemeClr val="accent2"/>
-          </a:effectRef>
-          <a:fontRef idx="minor">
-            <a:schemeClr val="lt1"/>
-          </a:fontRef>
-        </p:style>
-        <p:txBody>
-          <a:bodyPr rtlCol="0" anchor="ctr"/>
-          <a:lstStyle/>
-          <a:p>
-            <a:pPr algn="ctr"/>
-            <a:r>
               <a:rPr lang="de-DE" dirty="0">
                 <a:latin typeface="Arial Rounded MT Bold" panose="020F0704030504030204" pitchFamily="34" charset="0"/>
               </a:rPr>
@@ -3346,7 +3369,7 @@
           </a:prstGeom>
           <a:ln w="28575" cap="flat" cmpd="sng" algn="ctr">
             <a:solidFill>
-              <a:schemeClr val="accent1"/>
+              <a:schemeClr val="accent5"/>
             </a:solidFill>
             <a:prstDash val="solid"/>
             <a:round/>
@@ -3458,6 +3481,11 @@
             </a:avLst>
           </a:prstGeom>
           <a:ln>
+            <a:solidFill>
+              <a:schemeClr val="bg1">
+                <a:lumMod val="50000"/>
+              </a:schemeClr>
+            </a:solidFill>
             <a:tailEnd type="triangle"/>
           </a:ln>
         </p:spPr>
@@ -3494,7 +3522,10 @@
           </a:prstGeom>
           <a:ln w="28575">
             <a:solidFill>
-              <a:schemeClr val="accent6"/>
+              <a:schemeClr val="accent5">
+                <a:lumMod val="60000"/>
+                <a:lumOff val="40000"/>
+              </a:schemeClr>
             </a:solidFill>
             <a:tailEnd type="triangle"/>
           </a:ln>
@@ -3532,7 +3563,7 @@
           </a:prstGeom>
           <a:ln w="28575">
             <a:solidFill>
-              <a:schemeClr val="accent2"/>
+              <a:schemeClr val="accent6"/>
             </a:solidFill>
             <a:prstDash val="sysDash"/>
             <a:tailEnd type="triangle"/>
@@ -3627,6 +3658,11 @@
             </a:avLst>
           </a:prstGeom>
           <a:ln>
+            <a:solidFill>
+              <a:schemeClr val="bg1">
+                <a:lumMod val="50000"/>
+              </a:schemeClr>
+            </a:solidFill>
             <a:tailEnd type="triangle"/>
           </a:ln>
         </p:spPr>
@@ -3719,6 +3755,11 @@
             </a:avLst>
           </a:prstGeom>
           <a:ln>
+            <a:solidFill>
+              <a:schemeClr val="bg1">
+                <a:lumMod val="50000"/>
+              </a:schemeClr>
+            </a:solidFill>
             <a:tailEnd type="triangle"/>
           </a:ln>
         </p:spPr>
@@ -3761,7 +3802,7 @@
           </a:solidFill>
           <a:ln>
             <a:solidFill>
-              <a:schemeClr val="accent6"/>
+              <a:schemeClr val="accent5"/>
             </a:solidFill>
           </a:ln>
         </p:spPr>
@@ -3822,7 +3863,7 @@
           </a:solidFill>
           <a:ln>
             <a:solidFill>
-              <a:schemeClr val="accent2"/>
+              <a:schemeClr val="accent6"/>
             </a:solidFill>
           </a:ln>
         </p:spPr>
@@ -3883,7 +3924,7 @@
           </a:solidFill>
           <a:ln>
             <a:solidFill>
-              <a:schemeClr val="accent1"/>
+              <a:schemeClr val="accent5"/>
             </a:solidFill>
           </a:ln>
         </p:spPr>
@@ -3920,10 +3961,479 @@
           </a:p>
         </p:txBody>
       </p:sp>
+      <p:sp>
+        <p:nvSpPr>
+          <p:cNvPr id="63" name="Rechteck 62"/>
+          <p:cNvSpPr/>
+          <p:nvPr/>
+        </p:nvSpPr>
+        <p:spPr>
+          <a:xfrm>
+            <a:off x="1683658" y="638629"/>
+            <a:ext cx="6734629" cy="3175273"/>
+          </a:xfrm>
+          <a:prstGeom prst="rect">
+            <a:avLst/>
+          </a:prstGeom>
+          <a:noFill/>
+          <a:ln w="44450">
+            <a:solidFill>
+              <a:schemeClr val="accent5"/>
+            </a:solidFill>
+            <a:prstDash val="sysDash"/>
+          </a:ln>
+        </p:spPr>
+        <p:style>
+          <a:lnRef idx="2">
+            <a:schemeClr val="accent1">
+              <a:shade val="50000"/>
+            </a:schemeClr>
+          </a:lnRef>
+          <a:fillRef idx="1">
+            <a:schemeClr val="accent1"/>
+          </a:fillRef>
+          <a:effectRef idx="0">
+            <a:schemeClr val="accent1"/>
+          </a:effectRef>
+          <a:fontRef idx="minor">
+            <a:schemeClr val="lt1"/>
+          </a:fontRef>
+        </p:style>
+        <p:txBody>
+          <a:bodyPr rtlCol="0" anchor="t"/>
+          <a:lstStyle/>
+          <a:p>
+            <a:r>
+              <a:rPr lang="de-DE" sz="2000" dirty="0">
+                <a:solidFill>
+                  <a:schemeClr val="accent5"/>
+                </a:solidFill>
+                <a:latin typeface="Arial Rounded MT Bold" panose="020F0704030504030204" pitchFamily="34" charset="0"/>
+              </a:rPr>
+              <a:t>Präsentation</a:t>
+            </a:r>
+          </a:p>
+        </p:txBody>
+      </p:sp>
+      <p:sp>
+        <p:nvSpPr>
+          <p:cNvPr id="64" name="Rechteck 63"/>
+          <p:cNvSpPr/>
+          <p:nvPr/>
+        </p:nvSpPr>
+        <p:spPr>
+          <a:xfrm>
+            <a:off x="1683657" y="3812605"/>
+            <a:ext cx="6734629" cy="1443741"/>
+          </a:xfrm>
+          <a:prstGeom prst="rect">
+            <a:avLst/>
+          </a:prstGeom>
+          <a:noFill/>
+          <a:ln w="44450">
+            <a:solidFill>
+              <a:schemeClr val="accent6"/>
+            </a:solidFill>
+            <a:prstDash val="sysDash"/>
+          </a:ln>
+        </p:spPr>
+        <p:style>
+          <a:lnRef idx="2">
+            <a:schemeClr val="accent1">
+              <a:shade val="50000"/>
+            </a:schemeClr>
+          </a:lnRef>
+          <a:fillRef idx="1">
+            <a:schemeClr val="accent1"/>
+          </a:fillRef>
+          <a:effectRef idx="0">
+            <a:schemeClr val="accent1"/>
+          </a:effectRef>
+          <a:fontRef idx="minor">
+            <a:schemeClr val="lt1"/>
+          </a:fontRef>
+        </p:style>
+        <p:txBody>
+          <a:bodyPr rtlCol="0" anchor="t"/>
+          <a:lstStyle/>
+          <a:p>
+            <a:r>
+              <a:rPr lang="de-DE" sz="2000" dirty="0">
+                <a:solidFill>
+                  <a:schemeClr val="accent6"/>
+                </a:solidFill>
+                <a:latin typeface="Arial Rounded MT Bold" panose="020F0704030504030204" pitchFamily="34" charset="0"/>
+              </a:rPr>
+              <a:t>Business Logik</a:t>
+            </a:r>
+          </a:p>
+        </p:txBody>
+      </p:sp>
     </p:spTree>
     <p:extLst>
       <p:ext uri="{BB962C8B-B14F-4D97-AF65-F5344CB8AC3E}">
         <p14:creationId xmlns:p14="http://schemas.microsoft.com/office/powerpoint/2010/main" val="3782286617"/>
+      </p:ext>
+    </p:extLst>
+  </p:cSld>
+  <p:clrMapOvr>
+    <a:masterClrMapping/>
+  </p:clrMapOvr>
+</p:sld>
+</file>
+
+<file path=ppt/slides/slide3.xml><?xml version="1.0" encoding="utf-8"?>
+<p:sld xmlns:a="http://schemas.openxmlformats.org/drawingml/2006/main" xmlns:r="http://schemas.openxmlformats.org/officeDocument/2006/relationships" xmlns:p="http://schemas.openxmlformats.org/presentationml/2006/main">
+  <p:cSld>
+    <p:spTree>
+      <p:nvGrpSpPr>
+        <p:cNvPr id="1" name=""/>
+        <p:cNvGrpSpPr/>
+        <p:nvPr/>
+      </p:nvGrpSpPr>
+      <p:grpSpPr>
+        <a:xfrm>
+          <a:off x="0" y="0"/>
+          <a:ext cx="0" cy="0"/>
+          <a:chOff x="0" y="0"/>
+          <a:chExt cx="0" cy="0"/>
+        </a:xfrm>
+      </p:grpSpPr>
+      <p:sp>
+        <p:nvSpPr>
+          <p:cNvPr id="4" name="Rechteck 3"/>
+          <p:cNvSpPr/>
+          <p:nvPr/>
+        </p:nvSpPr>
+        <p:spPr>
+          <a:xfrm>
+            <a:off x="2207986" y="812800"/>
+            <a:ext cx="1611085" cy="812800"/>
+          </a:xfrm>
+          <a:prstGeom prst="rect">
+            <a:avLst/>
+          </a:prstGeom>
+        </p:spPr>
+        <p:style>
+          <a:lnRef idx="0">
+            <a:schemeClr val="accent5"/>
+          </a:lnRef>
+          <a:fillRef idx="3">
+            <a:schemeClr val="accent5"/>
+          </a:fillRef>
+          <a:effectRef idx="3">
+            <a:schemeClr val="accent5"/>
+          </a:effectRef>
+          <a:fontRef idx="minor">
+            <a:schemeClr val="lt1"/>
+          </a:fontRef>
+        </p:style>
+        <p:txBody>
+          <a:bodyPr rtlCol="0" anchor="ctr"/>
+          <a:lstStyle/>
+          <a:p>
+            <a:pPr algn="ctr"/>
+            <a:r>
+              <a:rPr lang="de-DE" dirty="0">
+                <a:latin typeface="Arial Rounded MT Bold" panose="020F0704030504030204" pitchFamily="34" charset="0"/>
+              </a:rPr>
+              <a:t>WPF-</a:t>
+            </a:r>
+            <a:r>
+              <a:rPr lang="de-DE" dirty="0" err="1">
+                <a:latin typeface="Arial Rounded MT Bold" panose="020F0704030504030204" pitchFamily="34" charset="0"/>
+              </a:rPr>
+              <a:t>ViewModel</a:t>
+            </a:r>
+            <a:endParaRPr lang="de-DE" dirty="0">
+              <a:latin typeface="Arial Rounded MT Bold" panose="020F0704030504030204" pitchFamily="34" charset="0"/>
+            </a:endParaRPr>
+          </a:p>
+        </p:txBody>
+      </p:sp>
+      <p:sp>
+        <p:nvSpPr>
+          <p:cNvPr id="5" name="Rechteck 4"/>
+          <p:cNvSpPr/>
+          <p:nvPr/>
+        </p:nvSpPr>
+        <p:spPr>
+          <a:xfrm>
+            <a:off x="4278086" y="812800"/>
+            <a:ext cx="1836057" cy="812800"/>
+          </a:xfrm>
+          <a:prstGeom prst="rect">
+            <a:avLst/>
+          </a:prstGeom>
+        </p:spPr>
+        <p:style>
+          <a:lnRef idx="0">
+            <a:schemeClr val="accent2"/>
+          </a:lnRef>
+          <a:fillRef idx="3">
+            <a:schemeClr val="accent2"/>
+          </a:fillRef>
+          <a:effectRef idx="3">
+            <a:schemeClr val="accent2"/>
+          </a:effectRef>
+          <a:fontRef idx="minor">
+            <a:schemeClr val="lt1"/>
+          </a:fontRef>
+        </p:style>
+        <p:txBody>
+          <a:bodyPr rtlCol="0" anchor="ctr"/>
+          <a:lstStyle/>
+          <a:p>
+            <a:pPr algn="ctr"/>
+            <a:r>
+              <a:rPr lang="de-DE" dirty="0">
+                <a:latin typeface="Arial Rounded MT Bold" panose="020F0704030504030204" pitchFamily="34" charset="0"/>
+              </a:rPr>
+              <a:t>&lt;&lt;</a:t>
+            </a:r>
+            <a:r>
+              <a:rPr lang="de-DE" dirty="0" err="1">
+                <a:latin typeface="Arial Rounded MT Bold" panose="020F0704030504030204" pitchFamily="34" charset="0"/>
+              </a:rPr>
+              <a:t>interface</a:t>
+            </a:r>
+            <a:r>
+              <a:rPr lang="de-DE" dirty="0">
+                <a:latin typeface="Arial Rounded MT Bold" panose="020F0704030504030204" pitchFamily="34" charset="0"/>
+              </a:rPr>
+              <a:t>&gt;&gt;</a:t>
+            </a:r>
+          </a:p>
+          <a:p>
+            <a:pPr algn="ctr"/>
+            <a:r>
+              <a:rPr lang="de-DE" dirty="0" err="1">
+                <a:latin typeface="Arial Rounded MT Bold" panose="020F0704030504030204" pitchFamily="34" charset="0"/>
+              </a:rPr>
+              <a:t>IRepository</a:t>
+            </a:r>
+            <a:endParaRPr lang="de-DE" dirty="0">
+              <a:latin typeface="Arial Rounded MT Bold" panose="020F0704030504030204" pitchFamily="34" charset="0"/>
+            </a:endParaRPr>
+          </a:p>
+        </p:txBody>
+      </p:sp>
+      <p:sp>
+        <p:nvSpPr>
+          <p:cNvPr id="6" name="Rechteck 5"/>
+          <p:cNvSpPr/>
+          <p:nvPr/>
+        </p:nvSpPr>
+        <p:spPr>
+          <a:xfrm>
+            <a:off x="2220688" y="2895600"/>
+            <a:ext cx="2808000" cy="812800"/>
+          </a:xfrm>
+          <a:prstGeom prst="rect">
+            <a:avLst/>
+          </a:prstGeom>
+        </p:spPr>
+        <p:style>
+          <a:lnRef idx="0">
+            <a:schemeClr val="accent2"/>
+          </a:lnRef>
+          <a:fillRef idx="3">
+            <a:schemeClr val="accent2"/>
+          </a:fillRef>
+          <a:effectRef idx="3">
+            <a:schemeClr val="accent2"/>
+          </a:effectRef>
+          <a:fontRef idx="minor">
+            <a:schemeClr val="lt1"/>
+          </a:fontRef>
+        </p:style>
+        <p:txBody>
+          <a:bodyPr rtlCol="0" anchor="ctr"/>
+          <a:lstStyle/>
+          <a:p>
+            <a:pPr algn="ctr"/>
+            <a:r>
+              <a:rPr lang="de-DE" dirty="0" err="1">
+                <a:latin typeface="Arial Rounded MT Bold" panose="020F0704030504030204" pitchFamily="34" charset="0"/>
+              </a:rPr>
+              <a:t>SensorDataRepository</a:t>
+            </a:r>
+            <a:endParaRPr lang="de-DE" dirty="0">
+              <a:latin typeface="Arial Rounded MT Bold" panose="020F0704030504030204" pitchFamily="34" charset="0"/>
+            </a:endParaRPr>
+          </a:p>
+        </p:txBody>
+      </p:sp>
+      <p:sp>
+        <p:nvSpPr>
+          <p:cNvPr id="7" name="Rechteck 6"/>
+          <p:cNvSpPr/>
+          <p:nvPr/>
+        </p:nvSpPr>
+        <p:spPr>
+          <a:xfrm>
+            <a:off x="5196115" y="2895600"/>
+            <a:ext cx="2808000" cy="812800"/>
+          </a:xfrm>
+          <a:prstGeom prst="rect">
+            <a:avLst/>
+          </a:prstGeom>
+        </p:spPr>
+        <p:style>
+          <a:lnRef idx="0">
+            <a:schemeClr val="accent2"/>
+          </a:lnRef>
+          <a:fillRef idx="3">
+            <a:schemeClr val="accent2"/>
+          </a:fillRef>
+          <a:effectRef idx="3">
+            <a:schemeClr val="accent2"/>
+          </a:effectRef>
+          <a:fontRef idx="minor">
+            <a:schemeClr val="lt1"/>
+          </a:fontRef>
+        </p:style>
+        <p:txBody>
+          <a:bodyPr rtlCol="0" anchor="ctr"/>
+          <a:lstStyle/>
+          <a:p>
+            <a:pPr algn="ctr"/>
+            <a:r>
+              <a:rPr lang="de-DE" dirty="0" err="1">
+                <a:latin typeface="Arial Rounded MT Bold" panose="020F0704030504030204" pitchFamily="34" charset="0"/>
+              </a:rPr>
+              <a:t>MockRepository</a:t>
+            </a:r>
+            <a:endParaRPr lang="de-DE" dirty="0">
+              <a:latin typeface="Arial Rounded MT Bold" panose="020F0704030504030204" pitchFamily="34" charset="0"/>
+            </a:endParaRPr>
+          </a:p>
+        </p:txBody>
+      </p:sp>
+      <p:cxnSp>
+        <p:nvCxnSpPr>
+          <p:cNvPr id="9" name="Gerade Verbindung mit Pfeil 8"/>
+          <p:cNvCxnSpPr>
+            <a:cxnSpLocks/>
+            <a:stCxn id="6" idx="0"/>
+            <a:endCxn id="5" idx="2"/>
+          </p:cNvCxnSpPr>
+          <p:nvPr/>
+        </p:nvCxnSpPr>
+        <p:spPr>
+          <a:xfrm flipV="1">
+            <a:off x="3624688" y="1625600"/>
+            <a:ext cx="1571427" cy="1270000"/>
+          </a:xfrm>
+          <a:prstGeom prst="straightConnector1">
+            <a:avLst/>
+          </a:prstGeom>
+          <a:ln w="28575">
+            <a:solidFill>
+              <a:schemeClr val="accent2"/>
+            </a:solidFill>
+            <a:tailEnd type="triangle" w="lg" len="lg"/>
+          </a:ln>
+        </p:spPr>
+        <p:style>
+          <a:lnRef idx="1">
+            <a:schemeClr val="accent1"/>
+          </a:lnRef>
+          <a:fillRef idx="0">
+            <a:schemeClr val="accent1"/>
+          </a:fillRef>
+          <a:effectRef idx="0">
+            <a:schemeClr val="accent1"/>
+          </a:effectRef>
+          <a:fontRef idx="minor">
+            <a:schemeClr val="tx1"/>
+          </a:fontRef>
+        </p:style>
+      </p:cxnSp>
+      <p:cxnSp>
+        <p:nvCxnSpPr>
+          <p:cNvPr id="11" name="Gerade Verbindung mit Pfeil 10"/>
+          <p:cNvCxnSpPr>
+            <a:cxnSpLocks/>
+            <a:stCxn id="7" idx="0"/>
+            <a:endCxn id="5" idx="2"/>
+          </p:cNvCxnSpPr>
+          <p:nvPr/>
+        </p:nvCxnSpPr>
+        <p:spPr>
+          <a:xfrm flipH="1" flipV="1">
+            <a:off x="5196115" y="1625600"/>
+            <a:ext cx="1404000" cy="1270000"/>
+          </a:xfrm>
+          <a:prstGeom prst="straightConnector1">
+            <a:avLst/>
+          </a:prstGeom>
+          <a:ln w="28575">
+            <a:solidFill>
+              <a:schemeClr val="accent2"/>
+            </a:solidFill>
+            <a:tailEnd type="triangle" w="lg" len="lg"/>
+          </a:ln>
+        </p:spPr>
+        <p:style>
+          <a:lnRef idx="1">
+            <a:schemeClr val="accent1"/>
+          </a:lnRef>
+          <a:fillRef idx="0">
+            <a:schemeClr val="accent1"/>
+          </a:fillRef>
+          <a:effectRef idx="0">
+            <a:schemeClr val="accent1"/>
+          </a:effectRef>
+          <a:fontRef idx="minor">
+            <a:schemeClr val="tx1"/>
+          </a:fontRef>
+        </p:style>
+      </p:cxnSp>
+      <p:cxnSp>
+        <p:nvCxnSpPr>
+          <p:cNvPr id="17" name="Gerade Verbindung mit Pfeil 16"/>
+          <p:cNvCxnSpPr>
+            <a:cxnSpLocks/>
+            <a:stCxn id="4" idx="3"/>
+            <a:endCxn id="5" idx="1"/>
+          </p:cNvCxnSpPr>
+          <p:nvPr/>
+        </p:nvCxnSpPr>
+        <p:spPr>
+          <a:xfrm>
+            <a:off x="3819071" y="1219200"/>
+            <a:ext cx="459015" cy="0"/>
+          </a:xfrm>
+          <a:prstGeom prst="straightConnector1">
+            <a:avLst/>
+          </a:prstGeom>
+          <a:ln w="28575">
+            <a:solidFill>
+              <a:schemeClr val="accent5"/>
+            </a:solidFill>
+            <a:tailEnd type="arrow" w="lg" len="lg"/>
+          </a:ln>
+        </p:spPr>
+        <p:style>
+          <a:lnRef idx="1">
+            <a:schemeClr val="accent1"/>
+          </a:lnRef>
+          <a:fillRef idx="0">
+            <a:schemeClr val="accent1"/>
+          </a:fillRef>
+          <a:effectRef idx="0">
+            <a:schemeClr val="accent1"/>
+          </a:effectRef>
+          <a:fontRef idx="minor">
+            <a:schemeClr val="tx1"/>
+          </a:fontRef>
+        </p:style>
+      </p:cxnSp>
+    </p:spTree>
+    <p:extLst>
+      <p:ext uri="{BB962C8B-B14F-4D97-AF65-F5344CB8AC3E}">
+        <p14:creationId xmlns:p14="http://schemas.microsoft.com/office/powerpoint/2010/main" val="647452769"/>
       </p:ext>
     </p:extLst>
   </p:cSld>

</xml_diff>